<commit_message>
integrate PptxTextboxShapeBuilder into PptxShapeBuilder and PptxTreeBuilder
</commit_message>
<xml_diff>
--- a/luna_authoring_system/test/test_assets/Sections.pptx
+++ b/luna_authoring_system/test/test_assets/Sections.pptx
@@ -291,7 +291,7 @@
           <a:p>
             <a:fld id="{5D6D0EBF-D941-1E4E-8AD7-77403B50F4CF}" type="datetimeFigureOut">
               <a:rPr lang="en-US" smtClean="0"/>
-              <a:t>4/22/24</a:t>
+              <a:t>8/13/2025</a:t>
             </a:fld>
             <a:endParaRPr lang="en-US"/>
           </a:p>
@@ -489,7 +489,7 @@
           <a:p>
             <a:fld id="{5D6D0EBF-D941-1E4E-8AD7-77403B50F4CF}" type="datetimeFigureOut">
               <a:rPr lang="en-US" smtClean="0"/>
-              <a:t>4/22/24</a:t>
+              <a:t>8/13/2025</a:t>
             </a:fld>
             <a:endParaRPr lang="en-US"/>
           </a:p>
@@ -697,7 +697,7 @@
           <a:p>
             <a:fld id="{5D6D0EBF-D941-1E4E-8AD7-77403B50F4CF}" type="datetimeFigureOut">
               <a:rPr lang="en-US" smtClean="0"/>
-              <a:t>4/22/24</a:t>
+              <a:t>8/13/2025</a:t>
             </a:fld>
             <a:endParaRPr lang="en-US"/>
           </a:p>
@@ -895,7 +895,7 @@
           <a:p>
             <a:fld id="{5D6D0EBF-D941-1E4E-8AD7-77403B50F4CF}" type="datetimeFigureOut">
               <a:rPr lang="en-US" smtClean="0"/>
-              <a:t>4/22/24</a:t>
+              <a:t>8/13/2025</a:t>
             </a:fld>
             <a:endParaRPr lang="en-US"/>
           </a:p>
@@ -1170,7 +1170,7 @@
           <a:p>
             <a:fld id="{5D6D0EBF-D941-1E4E-8AD7-77403B50F4CF}" type="datetimeFigureOut">
               <a:rPr lang="en-US" smtClean="0"/>
-              <a:t>4/22/24</a:t>
+              <a:t>8/13/2025</a:t>
             </a:fld>
             <a:endParaRPr lang="en-US"/>
           </a:p>
@@ -1435,7 +1435,7 @@
           <a:p>
             <a:fld id="{5D6D0EBF-D941-1E4E-8AD7-77403B50F4CF}" type="datetimeFigureOut">
               <a:rPr lang="en-US" smtClean="0"/>
-              <a:t>4/22/24</a:t>
+              <a:t>8/13/2025</a:t>
             </a:fld>
             <a:endParaRPr lang="en-US"/>
           </a:p>
@@ -1847,7 +1847,7 @@
           <a:p>
             <a:fld id="{5D6D0EBF-D941-1E4E-8AD7-77403B50F4CF}" type="datetimeFigureOut">
               <a:rPr lang="en-US" smtClean="0"/>
-              <a:t>4/22/24</a:t>
+              <a:t>8/13/2025</a:t>
             </a:fld>
             <a:endParaRPr lang="en-US"/>
           </a:p>
@@ -1988,7 +1988,7 @@
           <a:p>
             <a:fld id="{5D6D0EBF-D941-1E4E-8AD7-77403B50F4CF}" type="datetimeFigureOut">
               <a:rPr lang="en-US" smtClean="0"/>
-              <a:t>4/22/24</a:t>
+              <a:t>8/13/2025</a:t>
             </a:fld>
             <a:endParaRPr lang="en-US"/>
           </a:p>
@@ -2101,7 +2101,7 @@
           <a:p>
             <a:fld id="{5D6D0EBF-D941-1E4E-8AD7-77403B50F4CF}" type="datetimeFigureOut">
               <a:rPr lang="en-US" smtClean="0"/>
-              <a:t>4/22/24</a:t>
+              <a:t>8/13/2025</a:t>
             </a:fld>
             <a:endParaRPr lang="en-US"/>
           </a:p>
@@ -2412,7 +2412,7 @@
           <a:p>
             <a:fld id="{5D6D0EBF-D941-1E4E-8AD7-77403B50F4CF}" type="datetimeFigureOut">
               <a:rPr lang="en-US" smtClean="0"/>
-              <a:t>4/22/24</a:t>
+              <a:t>8/13/2025</a:t>
             </a:fld>
             <a:endParaRPr lang="en-US"/>
           </a:p>
@@ -2700,7 +2700,7 @@
           <a:p>
             <a:fld id="{5D6D0EBF-D941-1E4E-8AD7-77403B50F4CF}" type="datetimeFigureOut">
               <a:rPr lang="en-US" smtClean="0"/>
-              <a:t>4/22/24</a:t>
+              <a:t>8/13/2025</a:t>
             </a:fld>
             <a:endParaRPr lang="en-US"/>
           </a:p>
@@ -2941,7 +2941,7 @@
           <a:p>
             <a:fld id="{5D6D0EBF-D941-1E4E-8AD7-77403B50F4CF}" type="datetimeFigureOut">
               <a:rPr lang="en-US" smtClean="0"/>
-              <a:t>4/22/24</a:t>
+              <a:t>8/13/2025</a:t>
             </a:fld>
             <a:endParaRPr lang="en-US"/>
           </a:p>
@@ -3360,52 +3360,6 @@
       </p:grpSpPr>
       <p:sp>
         <p:nvSpPr>
-          <p:cNvPr id="2" name="Rectangle 1">
-            <a:extLst>
-              <a:ext uri="{FF2B5EF4-FFF2-40B4-BE49-F238E27FC236}">
-                <a16:creationId xmlns:a16="http://schemas.microsoft.com/office/drawing/2014/main" id="{75DDCEAA-4ED3-16FC-814B-70ED6D294A23}"/>
-              </a:ext>
-            </a:extLst>
-          </p:cNvPr>
-          <p:cNvSpPr/>
-          <p:nvPr/>
-        </p:nvSpPr>
-        <p:spPr>
-          <a:xfrm>
-            <a:off x="1859622" y="1006867"/>
-            <a:ext cx="2969232" cy="2691830"/>
-          </a:xfrm>
-          <a:prstGeom prst="rect">
-            <a:avLst/>
-          </a:prstGeom>
-        </p:spPr>
-        <p:style>
-          <a:lnRef idx="2">
-            <a:schemeClr val="accent1">
-              <a:shade val="15000"/>
-            </a:schemeClr>
-          </a:lnRef>
-          <a:fillRef idx="1">
-            <a:schemeClr val="accent1"/>
-          </a:fillRef>
-          <a:effectRef idx="0">
-            <a:schemeClr val="accent1"/>
-          </a:effectRef>
-          <a:fontRef idx="minor">
-            <a:schemeClr val="lt1"/>
-          </a:fontRef>
-        </p:style>
-        <p:txBody>
-          <a:bodyPr rtlCol="0" anchor="ctr"/>
-          <a:lstStyle/>
-          <a:p>
-            <a:pPr algn="ctr"/>
-            <a:endParaRPr lang="en-KR"/>
-          </a:p>
-        </p:txBody>
-      </p:sp>
-      <p:sp>
-        <p:nvSpPr>
           <p:cNvPr id="4" name="TextBox 3">
             <a:extLst>
               <a:ext uri="{FF2B5EF4-FFF2-40B4-BE49-F238E27FC236}">

</xml_diff>